<commit_message>
Add support for Powerpoint formats
</commit_message>
<xml_diff>
--- a/src/test/resources/powerpoint/test-without-macro.pptx
+++ b/src/test/resources/powerpoint/test-without-macro.pptx
@@ -104,6 +104,11 @@
       </a:defRPr>
     </a:lvl9pPr>
   </p:defaultTextStyle>
+  <p:extLst>
+    <p:ext uri="{EFAFB233-063F-42B5-8137-9DF3F51BA10A}">
+      <p15:sldGuideLst xmlns:p15="http://schemas.microsoft.com/office/powerpoint/2012/main"/>
+    </p:ext>
+  </p:extLst>
 </p:presentation>
 </file>
 
@@ -238,7 +243,7 @@
           <a:p>
             <a:fld id="{FE1131D4-2524-4127-AF2F-94B9403B4AD8}" type="datetimeFigureOut">
               <a:rPr lang="fr-BE" smtClean="0"/>
-              <a:t>08-05-18</a:t>
+              <a:t>09-05-18</a:t>
             </a:fld>
             <a:endParaRPr lang="fr-BE"/>
           </a:p>
@@ -408,7 +413,7 @@
           <a:p>
             <a:fld id="{FE1131D4-2524-4127-AF2F-94B9403B4AD8}" type="datetimeFigureOut">
               <a:rPr lang="fr-BE" smtClean="0"/>
-              <a:t>08-05-18</a:t>
+              <a:t>09-05-18</a:t>
             </a:fld>
             <a:endParaRPr lang="fr-BE"/>
           </a:p>
@@ -588,7 +593,7 @@
           <a:p>
             <a:fld id="{FE1131D4-2524-4127-AF2F-94B9403B4AD8}" type="datetimeFigureOut">
               <a:rPr lang="fr-BE" smtClean="0"/>
-              <a:t>08-05-18</a:t>
+              <a:t>09-05-18</a:t>
             </a:fld>
             <a:endParaRPr lang="fr-BE"/>
           </a:p>
@@ -758,7 +763,7 @@
           <a:p>
             <a:fld id="{FE1131D4-2524-4127-AF2F-94B9403B4AD8}" type="datetimeFigureOut">
               <a:rPr lang="fr-BE" smtClean="0"/>
-              <a:t>08-05-18</a:t>
+              <a:t>09-05-18</a:t>
             </a:fld>
             <a:endParaRPr lang="fr-BE"/>
           </a:p>
@@ -1004,7 +1009,7 @@
           <a:p>
             <a:fld id="{FE1131D4-2524-4127-AF2F-94B9403B4AD8}" type="datetimeFigureOut">
               <a:rPr lang="fr-BE" smtClean="0"/>
-              <a:t>08-05-18</a:t>
+              <a:t>09-05-18</a:t>
             </a:fld>
             <a:endParaRPr lang="fr-BE"/>
           </a:p>
@@ -1236,7 +1241,7 @@
           <a:p>
             <a:fld id="{FE1131D4-2524-4127-AF2F-94B9403B4AD8}" type="datetimeFigureOut">
               <a:rPr lang="fr-BE" smtClean="0"/>
-              <a:t>08-05-18</a:t>
+              <a:t>09-05-18</a:t>
             </a:fld>
             <a:endParaRPr lang="fr-BE"/>
           </a:p>
@@ -1603,7 +1608,7 @@
           <a:p>
             <a:fld id="{FE1131D4-2524-4127-AF2F-94B9403B4AD8}" type="datetimeFigureOut">
               <a:rPr lang="fr-BE" smtClean="0"/>
-              <a:t>08-05-18</a:t>
+              <a:t>09-05-18</a:t>
             </a:fld>
             <a:endParaRPr lang="fr-BE"/>
           </a:p>
@@ -1721,7 +1726,7 @@
           <a:p>
             <a:fld id="{FE1131D4-2524-4127-AF2F-94B9403B4AD8}" type="datetimeFigureOut">
               <a:rPr lang="fr-BE" smtClean="0"/>
-              <a:t>08-05-18</a:t>
+              <a:t>09-05-18</a:t>
             </a:fld>
             <a:endParaRPr lang="fr-BE"/>
           </a:p>
@@ -1816,7 +1821,7 @@
           <a:p>
             <a:fld id="{FE1131D4-2524-4127-AF2F-94B9403B4AD8}" type="datetimeFigureOut">
               <a:rPr lang="fr-BE" smtClean="0"/>
-              <a:t>08-05-18</a:t>
+              <a:t>09-05-18</a:t>
             </a:fld>
             <a:endParaRPr lang="fr-BE"/>
           </a:p>
@@ -2093,7 +2098,7 @@
           <a:p>
             <a:fld id="{FE1131D4-2524-4127-AF2F-94B9403B4AD8}" type="datetimeFigureOut">
               <a:rPr lang="fr-BE" smtClean="0"/>
-              <a:t>08-05-18</a:t>
+              <a:t>09-05-18</a:t>
             </a:fld>
             <a:endParaRPr lang="fr-BE"/>
           </a:p>
@@ -2346,7 +2351,7 @@
           <a:p>
             <a:fld id="{FE1131D4-2524-4127-AF2F-94B9403B4AD8}" type="datetimeFigureOut">
               <a:rPr lang="fr-BE" smtClean="0"/>
-              <a:t>08-05-18</a:t>
+              <a:t>09-05-18</a:t>
             </a:fld>
             <a:endParaRPr lang="fr-BE"/>
           </a:p>
@@ -2559,7 +2564,7 @@
           <a:p>
             <a:fld id="{FE1131D4-2524-4127-AF2F-94B9403B4AD8}" type="datetimeFigureOut">
               <a:rPr lang="fr-BE" smtClean="0"/>
-              <a:t>08-05-18</a:t>
+              <a:t>09-05-18</a:t>
             </a:fld>
             <a:endParaRPr lang="fr-BE"/>
           </a:p>
@@ -2966,7 +2971,7 @@
       </p:grpSpPr>
       <p:sp>
         <p:nvSpPr>
-          <p:cNvPr id="2" name="Title 1"/>
+          <p:cNvPr id="4" name="Title 1"/>
           <p:cNvSpPr>
             <a:spLocks noGrp="1"/>
           </p:cNvSpPr>
@@ -2974,18 +2979,27 @@
             <p:ph type="ctrTitle"/>
           </p:nvPr>
         </p:nvSpPr>
-        <p:spPr/>
-        <p:txBody>
-          <a:bodyPr/>
-          <a:lstStyle/>
-          <a:p>
-            <a:endParaRPr lang="fr-BE"/>
-          </a:p>
-        </p:txBody>
-      </p:sp>
-      <p:sp>
-        <p:nvSpPr>
-          <p:cNvPr id="3" name="Subtitle 2"/>
+        <p:spPr>
+          <a:xfrm>
+            <a:off x="1524000" y="1122363"/>
+            <a:ext cx="9144000" cy="2387600"/>
+          </a:xfrm>
+        </p:spPr>
+        <p:txBody>
+          <a:bodyPr/>
+          <a:lstStyle/>
+          <a:p>
+            <a:r>
+              <a:rPr lang="fr-BE" altLang="fr-FR" dirty="0" smtClean="0"/>
+              <a:t>TEXT</a:t>
+            </a:r>
+            <a:endParaRPr lang="fr-BE" altLang="fr-FR" dirty="0" smtClean="0"/>
+          </a:p>
+        </p:txBody>
+      </p:sp>
+      <p:sp>
+        <p:nvSpPr>
+          <p:cNvPr id="5" name="Subtitle 2"/>
           <p:cNvSpPr>
             <a:spLocks noGrp="1"/>
           </p:cNvSpPr>
@@ -2993,12 +3007,101 @@
             <p:ph type="subTitle" idx="1"/>
           </p:nvPr>
         </p:nvSpPr>
-        <p:spPr/>
-        <p:txBody>
-          <a:bodyPr/>
-          <a:lstStyle/>
-          <a:p>
-            <a:endParaRPr lang="fr-BE"/>
+        <p:spPr>
+          <a:xfrm>
+            <a:off x="1524000" y="3602038"/>
+            <a:ext cx="9144000" cy="1655762"/>
+          </a:xfrm>
+        </p:spPr>
+        <p:txBody>
+          <a:bodyPr/>
+          <a:lstStyle/>
+          <a:p>
+            <a:r>
+              <a:rPr lang="fr-BE" altLang="fr-FR" dirty="0" smtClean="0">
+                <a:hlinkClick r:id="rId2"/>
+              </a:rPr>
+              <a:t>http://www.google.com</a:t>
+            </a:r>
+            <a:r>
+              <a:rPr lang="fr-BE" altLang="fr-FR" dirty="0" smtClean="0"/>
+              <a:t> </a:t>
+            </a:r>
+            <a:endParaRPr lang="fr-BE" altLang="fr-FR" dirty="0" smtClean="0"/>
+          </a:p>
+        </p:txBody>
+      </p:sp>
+      <p:pic>
+        <p:nvPicPr>
+          <p:cNvPr id="6" name="Picture 5"/>
+          <p:cNvPicPr>
+            <a:picLocks noChangeAspect="1"/>
+          </p:cNvPicPr>
+          <p:nvPr/>
+        </p:nvPicPr>
+        <p:blipFill>
+          <a:blip r:embed="rId3" cstate="print">
+            <a:extLst>
+              <a:ext uri="{28A0092B-C50C-407E-A947-70E740481C1C}">
+                <a14:useLocalDpi xmlns:a14="http://schemas.microsoft.com/office/drawing/2010/main" val="0"/>
+              </a:ext>
+            </a:extLst>
+          </a:blip>
+          <a:stretch>
+            <a:fillRect/>
+          </a:stretch>
+        </p:blipFill>
+        <p:spPr>
+          <a:xfrm>
+            <a:off x="7306962" y="4062827"/>
+            <a:ext cx="3875388" cy="2028410"/>
+          </a:xfrm>
+          <a:prstGeom prst="rect">
+            <a:avLst/>
+          </a:prstGeom>
+        </p:spPr>
+      </p:pic>
+      <p:sp>
+        <p:nvSpPr>
+          <p:cNvPr id="7" name="Rectangle 6"/>
+          <p:cNvSpPr/>
+          <p:nvPr/>
+        </p:nvSpPr>
+        <p:spPr>
+          <a:xfrm>
+            <a:off x="518984" y="543697"/>
+            <a:ext cx="4572000" cy="2809103"/>
+          </a:xfrm>
+          <a:prstGeom prst="rect">
+            <a:avLst/>
+          </a:prstGeom>
+        </p:spPr>
+        <p:style>
+          <a:lnRef idx="2">
+            <a:schemeClr val="accent6">
+              <a:shade val="50000"/>
+            </a:schemeClr>
+          </a:lnRef>
+          <a:fillRef idx="1">
+            <a:schemeClr val="accent6"/>
+          </a:fillRef>
+          <a:effectRef idx="0">
+            <a:schemeClr val="accent6"/>
+          </a:effectRef>
+          <a:fontRef idx="minor">
+            <a:schemeClr val="lt1"/>
+          </a:fontRef>
+        </p:style>
+        <p:txBody>
+          <a:bodyPr rtlCol="0" anchor="ctr"/>
+          <a:lstStyle/>
+          <a:p>
+            <a:pPr algn="ctr"/>
+            <a:r>
+              <a:rPr lang="fr-BE" dirty="0" smtClean="0"/>
+              <a:t>SHAPE</a:t>
+            </a:r>
+            <a:endParaRPr lang="fr-BE" dirty="0"/>
           </a:p>
         </p:txBody>
       </p:sp>

</xml_diff>